<commit_message>
final dex powerpoint - needs confirmation
</commit_message>
<xml_diff>
--- a/DEX DEMO DAY.pptx
+++ b/DEX DEMO DAY.pptx
@@ -8,6 +8,11 @@
     <p:sldId id="257" r:id="rId2"/>
     <p:sldId id="259" r:id="rId3"/>
     <p:sldId id="261" r:id="rId4"/>
+    <p:sldId id="260" r:id="rId5"/>
+    <p:sldId id="263" r:id="rId6"/>
+    <p:sldId id="265" r:id="rId7"/>
+    <p:sldId id="266" r:id="rId8"/>
+    <p:sldId id="267" r:id="rId9"/>
   </p:sldIdLst>
   <p:sldSz cx="12192000" cy="6858000"/>
   <p:notesSz cx="6858000" cy="9144000"/>
@@ -164,7 +169,7 @@
           <a:noFill/>
           <a:extLst>
             <a:ext uri="{909E8E84-426E-40dd-AFC4-6F175D3DCCD1}">
-              <a14:hiddenFill xmlns:a14="http://schemas.microsoft.com/office/drawing/2010/main" xmlns="">
+              <a14:hiddenFill xmlns="" xmlns:a14="http://schemas.microsoft.com/office/drawing/2010/main">
                 <a:solidFill>
                   <a:srgbClr val="FFFFFF"/>
                 </a:solidFill>
@@ -224,7 +229,7 @@
             </a:ln>
             <a:extLst>
               <a:ext uri="{91240B29-F687-4f45-9708-019B960494DF}">
-                <a14:hiddenLine xmlns:a14="http://schemas.microsoft.com/office/drawing/2010/main" xmlns="" w="9525">
+                <a14:hiddenLine xmlns="" xmlns:a14="http://schemas.microsoft.com/office/drawing/2010/main" w="9525">
                   <a:solidFill>
                     <a:srgbClr val="000000"/>
                   </a:solidFill>
@@ -314,7 +319,7 @@
             </a:ln>
             <a:extLst>
               <a:ext uri="{91240B29-F687-4f45-9708-019B960494DF}">
-                <a14:hiddenLine xmlns:a14="http://schemas.microsoft.com/office/drawing/2010/main" xmlns="" w="9525">
+                <a14:hiddenLine xmlns="" xmlns:a14="http://schemas.microsoft.com/office/drawing/2010/main" w="9525">
                   <a:solidFill>
                     <a:srgbClr val="000000"/>
                   </a:solidFill>
@@ -404,7 +409,7 @@
             </a:ln>
             <a:extLst>
               <a:ext uri="{91240B29-F687-4f45-9708-019B960494DF}">
-                <a14:hiddenLine xmlns:a14="http://schemas.microsoft.com/office/drawing/2010/main" xmlns="" w="9525">
+                <a14:hiddenLine xmlns="" xmlns:a14="http://schemas.microsoft.com/office/drawing/2010/main" w="9525">
                   <a:solidFill>
                     <a:srgbClr val="000000"/>
                   </a:solidFill>
@@ -438,7 +443,7 @@
             </a:ln>
             <a:extLst>
               <a:ext uri="{91240B29-F687-4f45-9708-019B960494DF}">
-                <a14:hiddenLine xmlns:a14="http://schemas.microsoft.com/office/drawing/2010/main" xmlns="" w="9525">
+                <a14:hiddenLine xmlns="" xmlns:a14="http://schemas.microsoft.com/office/drawing/2010/main" w="9525">
                   <a:solidFill>
                     <a:srgbClr val="000000"/>
                   </a:solidFill>
@@ -528,7 +533,7 @@
             </a:ln>
             <a:extLst>
               <a:ext uri="{91240B29-F687-4f45-9708-019B960494DF}">
-                <a14:hiddenLine xmlns:a14="http://schemas.microsoft.com/office/drawing/2010/main" xmlns="" w="9525">
+                <a14:hiddenLine xmlns="" xmlns:a14="http://schemas.microsoft.com/office/drawing/2010/main" w="9525">
                   <a:solidFill>
                     <a:srgbClr val="000000"/>
                   </a:solidFill>
@@ -590,7 +595,7 @@
             </a:ln>
             <a:extLst>
               <a:ext uri="{91240B29-F687-4f45-9708-019B960494DF}">
-                <a14:hiddenLine xmlns:a14="http://schemas.microsoft.com/office/drawing/2010/main" xmlns="" w="9525">
+                <a14:hiddenLine xmlns="" xmlns:a14="http://schemas.microsoft.com/office/drawing/2010/main" w="9525">
                   <a:solidFill>
                     <a:srgbClr val="000000"/>
                   </a:solidFill>
@@ -652,7 +657,7 @@
             </a:ln>
             <a:extLst>
               <a:ext uri="{91240B29-F687-4f45-9708-019B960494DF}">
-                <a14:hiddenLine xmlns:a14="http://schemas.microsoft.com/office/drawing/2010/main" xmlns="" w="9525">
+                <a14:hiddenLine xmlns="" xmlns:a14="http://schemas.microsoft.com/office/drawing/2010/main" w="9525">
                   <a:solidFill>
                     <a:srgbClr val="000000"/>
                   </a:solidFill>
@@ -742,7 +747,7 @@
             </a:ln>
             <a:extLst>
               <a:ext uri="{91240B29-F687-4f45-9708-019B960494DF}">
-                <a14:hiddenLine xmlns:a14="http://schemas.microsoft.com/office/drawing/2010/main" xmlns="" w="9525">
+                <a14:hiddenLine xmlns="" xmlns:a14="http://schemas.microsoft.com/office/drawing/2010/main" w="9525">
                   <a:solidFill>
                     <a:srgbClr val="000000"/>
                   </a:solidFill>
@@ -804,7 +809,7 @@
             </a:ln>
             <a:extLst>
               <a:ext uri="{91240B29-F687-4f45-9708-019B960494DF}">
-                <a14:hiddenLine xmlns:a14="http://schemas.microsoft.com/office/drawing/2010/main" xmlns="" w="9525">
+                <a14:hiddenLine xmlns="" xmlns:a14="http://schemas.microsoft.com/office/drawing/2010/main" w="9525">
                   <a:solidFill>
                     <a:srgbClr val="000000"/>
                   </a:solidFill>
@@ -866,7 +871,7 @@
             </a:ln>
             <a:extLst>
               <a:ext uri="{91240B29-F687-4f45-9708-019B960494DF}">
-                <a14:hiddenLine xmlns:a14="http://schemas.microsoft.com/office/drawing/2010/main" xmlns="" w="9525">
+                <a14:hiddenLine xmlns="" xmlns:a14="http://schemas.microsoft.com/office/drawing/2010/main" w="9525">
                   <a:solidFill>
                     <a:srgbClr val="000000"/>
                   </a:solidFill>
@@ -956,7 +961,7 @@
             </a:ln>
             <a:extLst>
               <a:ext uri="{91240B29-F687-4f45-9708-019B960494DF}">
-                <a14:hiddenLine xmlns:a14="http://schemas.microsoft.com/office/drawing/2010/main" xmlns="" w="9525">
+                <a14:hiddenLine xmlns="" xmlns:a14="http://schemas.microsoft.com/office/drawing/2010/main" w="9525">
                   <a:solidFill>
                     <a:srgbClr val="000000"/>
                   </a:solidFill>
@@ -1046,7 +1051,7 @@
             </a:ln>
             <a:extLst>
               <a:ext uri="{91240B29-F687-4f45-9708-019B960494DF}">
-                <a14:hiddenLine xmlns:a14="http://schemas.microsoft.com/office/drawing/2010/main" xmlns="" w="9525">
+                <a14:hiddenLine xmlns="" xmlns:a14="http://schemas.microsoft.com/office/drawing/2010/main" w="9525">
                   <a:solidFill>
                     <a:srgbClr val="000000"/>
                   </a:solidFill>
@@ -1108,7 +1113,7 @@
             </a:ln>
             <a:extLst>
               <a:ext uri="{91240B29-F687-4f45-9708-019B960494DF}">
-                <a14:hiddenLine xmlns:a14="http://schemas.microsoft.com/office/drawing/2010/main" xmlns="" w="9525">
+                <a14:hiddenLine xmlns="" xmlns:a14="http://schemas.microsoft.com/office/drawing/2010/main" w="9525">
                   <a:solidFill>
                     <a:srgbClr val="000000"/>
                   </a:solidFill>
@@ -1218,7 +1223,7 @@
             </a:ln>
             <a:extLst>
               <a:ext uri="{91240B29-F687-4f45-9708-019B960494DF}">
-                <a14:hiddenLine xmlns:a14="http://schemas.microsoft.com/office/drawing/2010/main" xmlns="" w="9525">
+                <a14:hiddenLine xmlns="" xmlns:a14="http://schemas.microsoft.com/office/drawing/2010/main" w="9525">
                   <a:solidFill>
                     <a:srgbClr val="000000"/>
                   </a:solidFill>
@@ -1280,7 +1285,7 @@
             </a:ln>
             <a:extLst>
               <a:ext uri="{91240B29-F687-4f45-9708-019B960494DF}">
-                <a14:hiddenLine xmlns:a14="http://schemas.microsoft.com/office/drawing/2010/main" xmlns="" w="9525">
+                <a14:hiddenLine xmlns="" xmlns:a14="http://schemas.microsoft.com/office/drawing/2010/main" w="9525">
                   <a:solidFill>
                     <a:srgbClr val="000000"/>
                   </a:solidFill>
@@ -1370,7 +1375,7 @@
             </a:ln>
             <a:extLst>
               <a:ext uri="{91240B29-F687-4f45-9708-019B960494DF}">
-                <a14:hiddenLine xmlns:a14="http://schemas.microsoft.com/office/drawing/2010/main" xmlns="" w="9525">
+                <a14:hiddenLine xmlns="" xmlns:a14="http://schemas.microsoft.com/office/drawing/2010/main" w="9525">
                   <a:solidFill>
                     <a:srgbClr val="000000"/>
                   </a:solidFill>
@@ -1460,7 +1465,7 @@
             </a:ln>
             <a:extLst>
               <a:ext uri="{91240B29-F687-4f45-9708-019B960494DF}">
-                <a14:hiddenLine xmlns:a14="http://schemas.microsoft.com/office/drawing/2010/main" xmlns="" w="9525">
+                <a14:hiddenLine xmlns="" xmlns:a14="http://schemas.microsoft.com/office/drawing/2010/main" w="9525">
                   <a:solidFill>
                     <a:srgbClr val="000000"/>
                   </a:solidFill>
@@ -1522,7 +1527,7 @@
             </a:ln>
             <a:extLst>
               <a:ext uri="{91240B29-F687-4f45-9708-019B960494DF}">
-                <a14:hiddenLine xmlns:a14="http://schemas.microsoft.com/office/drawing/2010/main" xmlns="" w="9525">
+                <a14:hiddenLine xmlns="" xmlns:a14="http://schemas.microsoft.com/office/drawing/2010/main" w="9525">
                   <a:solidFill>
                     <a:srgbClr val="000000"/>
                   </a:solidFill>
@@ -1612,7 +1617,7 @@
             </a:ln>
             <a:extLst>
               <a:ext uri="{91240B29-F687-4f45-9708-019B960494DF}">
-                <a14:hiddenLine xmlns:a14="http://schemas.microsoft.com/office/drawing/2010/main" xmlns="" w="9525">
+                <a14:hiddenLine xmlns="" xmlns:a14="http://schemas.microsoft.com/office/drawing/2010/main" w="9525">
                   <a:solidFill>
                     <a:srgbClr val="000000"/>
                   </a:solidFill>
@@ -1702,7 +1707,7 @@
             </a:ln>
             <a:extLst>
               <a:ext uri="{91240B29-F687-4f45-9708-019B960494DF}">
-                <a14:hiddenLine xmlns:a14="http://schemas.microsoft.com/office/drawing/2010/main" xmlns="" w="9525">
+                <a14:hiddenLine xmlns="" xmlns:a14="http://schemas.microsoft.com/office/drawing/2010/main" w="9525">
                   <a:solidFill>
                     <a:srgbClr val="000000"/>
                   </a:solidFill>
@@ -1758,7 +1763,7 @@
             </a:ln>
             <a:extLst>
               <a:ext uri="{91240B29-F687-4f45-9708-019B960494DF}">
-                <a14:hiddenLine xmlns:a14="http://schemas.microsoft.com/office/drawing/2010/main" xmlns="" w="9525">
+                <a14:hiddenLine xmlns="" xmlns:a14="http://schemas.microsoft.com/office/drawing/2010/main" w="9525">
                   <a:solidFill>
                     <a:srgbClr val="000000"/>
                   </a:solidFill>
@@ -1848,7 +1853,7 @@
             </a:ln>
             <a:extLst>
               <a:ext uri="{91240B29-F687-4f45-9708-019B960494DF}">
-                <a14:hiddenLine xmlns:a14="http://schemas.microsoft.com/office/drawing/2010/main" xmlns="" w="9525">
+                <a14:hiddenLine xmlns="" xmlns:a14="http://schemas.microsoft.com/office/drawing/2010/main" w="9525">
                   <a:solidFill>
                     <a:srgbClr val="000000"/>
                   </a:solidFill>
@@ -1904,7 +1909,7 @@
             </a:ln>
             <a:extLst>
               <a:ext uri="{91240B29-F687-4f45-9708-019B960494DF}">
-                <a14:hiddenLine xmlns:a14="http://schemas.microsoft.com/office/drawing/2010/main" xmlns="" w="9525">
+                <a14:hiddenLine xmlns="" xmlns:a14="http://schemas.microsoft.com/office/drawing/2010/main" w="9525">
                   <a:solidFill>
                     <a:srgbClr val="000000"/>
                   </a:solidFill>
@@ -1994,7 +1999,7 @@
             </a:ln>
             <a:extLst>
               <a:ext uri="{91240B29-F687-4f45-9708-019B960494DF}">
-                <a14:hiddenLine xmlns:a14="http://schemas.microsoft.com/office/drawing/2010/main" xmlns="" w="9525">
+                <a14:hiddenLine xmlns="" xmlns:a14="http://schemas.microsoft.com/office/drawing/2010/main" w="9525">
                   <a:solidFill>
                     <a:srgbClr val="000000"/>
                   </a:solidFill>
@@ -2062,7 +2067,7 @@
             </a:ln>
             <a:extLst>
               <a:ext uri="{91240B29-F687-4f45-9708-019B960494DF}">
-                <a14:hiddenLine xmlns:a14="http://schemas.microsoft.com/office/drawing/2010/main" xmlns="" w="9525">
+                <a14:hiddenLine xmlns="" xmlns:a14="http://schemas.microsoft.com/office/drawing/2010/main" w="9525">
                   <a:solidFill>
                     <a:srgbClr val="000000"/>
                   </a:solidFill>
@@ -2152,7 +2157,7 @@
             </a:ln>
             <a:extLst>
               <a:ext uri="{91240B29-F687-4f45-9708-019B960494DF}">
-                <a14:hiddenLine xmlns:a14="http://schemas.microsoft.com/office/drawing/2010/main" xmlns="" w="9525">
+                <a14:hiddenLine xmlns="" xmlns:a14="http://schemas.microsoft.com/office/drawing/2010/main" w="9525">
                   <a:solidFill>
                     <a:srgbClr val="000000"/>
                   </a:solidFill>
@@ -2220,7 +2225,7 @@
             </a:ln>
             <a:extLst>
               <a:ext uri="{91240B29-F687-4f45-9708-019B960494DF}">
-                <a14:hiddenLine xmlns:a14="http://schemas.microsoft.com/office/drawing/2010/main" xmlns="" w="9525">
+                <a14:hiddenLine xmlns="" xmlns:a14="http://schemas.microsoft.com/office/drawing/2010/main" w="9525">
                   <a:solidFill>
                     <a:srgbClr val="000000"/>
                   </a:solidFill>
@@ -2310,7 +2315,7 @@
             </a:ln>
             <a:extLst>
               <a:ext uri="{91240B29-F687-4f45-9708-019B960494DF}">
-                <a14:hiddenLine xmlns:a14="http://schemas.microsoft.com/office/drawing/2010/main" xmlns="" w="9525">
+                <a14:hiddenLine xmlns="" xmlns:a14="http://schemas.microsoft.com/office/drawing/2010/main" w="9525">
                   <a:solidFill>
                     <a:srgbClr val="000000"/>
                   </a:solidFill>
@@ -2344,7 +2349,7 @@
             </a:ln>
             <a:extLst>
               <a:ext uri="{91240B29-F687-4f45-9708-019B960494DF}">
-                <a14:hiddenLine xmlns:a14="http://schemas.microsoft.com/office/drawing/2010/main" xmlns="" w="9525">
+                <a14:hiddenLine xmlns="" xmlns:a14="http://schemas.microsoft.com/office/drawing/2010/main" w="9525">
                   <a:solidFill>
                     <a:srgbClr val="000000"/>
                   </a:solidFill>
@@ -2434,7 +2439,7 @@
             </a:ln>
             <a:extLst>
               <a:ext uri="{91240B29-F687-4f45-9708-019B960494DF}">
-                <a14:hiddenLine xmlns:a14="http://schemas.microsoft.com/office/drawing/2010/main" xmlns="" w="9525">
+                <a14:hiddenLine xmlns="" xmlns:a14="http://schemas.microsoft.com/office/drawing/2010/main" w="9525">
                   <a:solidFill>
                     <a:srgbClr val="000000"/>
                   </a:solidFill>
@@ -2496,7 +2501,7 @@
             </a:ln>
             <a:extLst>
               <a:ext uri="{91240B29-F687-4f45-9708-019B960494DF}">
-                <a14:hiddenLine xmlns:a14="http://schemas.microsoft.com/office/drawing/2010/main" xmlns="" w="9525">
+                <a14:hiddenLine xmlns="" xmlns:a14="http://schemas.microsoft.com/office/drawing/2010/main" w="9525">
                   <a:solidFill>
                     <a:srgbClr val="000000"/>
                   </a:solidFill>
@@ -2558,7 +2563,7 @@
             </a:ln>
             <a:extLst>
               <a:ext uri="{91240B29-F687-4f45-9708-019B960494DF}">
-                <a14:hiddenLine xmlns:a14="http://schemas.microsoft.com/office/drawing/2010/main" xmlns="" w="9525">
+                <a14:hiddenLine xmlns="" xmlns:a14="http://schemas.microsoft.com/office/drawing/2010/main" w="9525">
                   <a:solidFill>
                     <a:srgbClr val="000000"/>
                   </a:solidFill>
@@ -2648,7 +2653,7 @@
             </a:ln>
             <a:extLst>
               <a:ext uri="{91240B29-F687-4f45-9708-019B960494DF}">
-                <a14:hiddenLine xmlns:a14="http://schemas.microsoft.com/office/drawing/2010/main" xmlns="" w="9525">
+                <a14:hiddenLine xmlns="" xmlns:a14="http://schemas.microsoft.com/office/drawing/2010/main" w="9525">
                   <a:solidFill>
                     <a:srgbClr val="000000"/>
                   </a:solidFill>
@@ -2716,7 +2721,7 @@
             </a:ln>
             <a:extLst>
               <a:ext uri="{91240B29-F687-4f45-9708-019B960494DF}">
-                <a14:hiddenLine xmlns:a14="http://schemas.microsoft.com/office/drawing/2010/main" xmlns="" w="9525">
+                <a14:hiddenLine xmlns="" xmlns:a14="http://schemas.microsoft.com/office/drawing/2010/main" w="9525">
                   <a:solidFill>
                     <a:srgbClr val="000000"/>
                   </a:solidFill>
@@ -2778,7 +2783,7 @@
             </a:ln>
             <a:extLst>
               <a:ext uri="{91240B29-F687-4f45-9708-019B960494DF}">
-                <a14:hiddenLine xmlns:a14="http://schemas.microsoft.com/office/drawing/2010/main" xmlns="" w="9525">
+                <a14:hiddenLine xmlns="" xmlns:a14="http://schemas.microsoft.com/office/drawing/2010/main" w="9525">
                   <a:solidFill>
                     <a:srgbClr val="000000"/>
                   </a:solidFill>
@@ -2868,7 +2873,7 @@
             </a:ln>
             <a:extLst>
               <a:ext uri="{91240B29-F687-4f45-9708-019B960494DF}">
-                <a14:hiddenLine xmlns:a14="http://schemas.microsoft.com/office/drawing/2010/main" xmlns="" w="9525">
+                <a14:hiddenLine xmlns="" xmlns:a14="http://schemas.microsoft.com/office/drawing/2010/main" w="9525">
                   <a:solidFill>
                     <a:srgbClr val="000000"/>
                   </a:solidFill>
@@ -2930,7 +2935,7 @@
             </a:ln>
             <a:extLst>
               <a:ext uri="{91240B29-F687-4f45-9708-019B960494DF}">
-                <a14:hiddenLine xmlns:a14="http://schemas.microsoft.com/office/drawing/2010/main" xmlns="" w="9525">
+                <a14:hiddenLine xmlns="" xmlns:a14="http://schemas.microsoft.com/office/drawing/2010/main" w="9525">
                   <a:solidFill>
                     <a:srgbClr val="000000"/>
                   </a:solidFill>
@@ -3020,7 +3025,7 @@
             </a:ln>
             <a:extLst>
               <a:ext uri="{91240B29-F687-4f45-9708-019B960494DF}">
-                <a14:hiddenLine xmlns:a14="http://schemas.microsoft.com/office/drawing/2010/main" xmlns="" w="9525">
+                <a14:hiddenLine xmlns="" xmlns:a14="http://schemas.microsoft.com/office/drawing/2010/main" w="9525">
                   <a:solidFill>
                     <a:srgbClr val="000000"/>
                   </a:solidFill>
@@ -3082,7 +3087,7 @@
             </a:ln>
             <a:extLst>
               <a:ext uri="{91240B29-F687-4f45-9708-019B960494DF}">
-                <a14:hiddenLine xmlns:a14="http://schemas.microsoft.com/office/drawing/2010/main" xmlns="" w="9525">
+                <a14:hiddenLine xmlns="" xmlns:a14="http://schemas.microsoft.com/office/drawing/2010/main" w="9525">
                   <a:solidFill>
                     <a:srgbClr val="000000"/>
                   </a:solidFill>
@@ -3172,7 +3177,7 @@
             </a:ln>
             <a:extLst>
               <a:ext uri="{91240B29-F687-4f45-9708-019B960494DF}">
-                <a14:hiddenLine xmlns:a14="http://schemas.microsoft.com/office/drawing/2010/main" xmlns="" w="9525">
+                <a14:hiddenLine xmlns="" xmlns:a14="http://schemas.microsoft.com/office/drawing/2010/main" w="9525">
                   <a:solidFill>
                     <a:srgbClr val="000000"/>
                   </a:solidFill>
@@ -3206,7 +3211,7 @@
             </a:ln>
             <a:extLst>
               <a:ext uri="{91240B29-F687-4f45-9708-019B960494DF}">
-                <a14:hiddenLine xmlns:a14="http://schemas.microsoft.com/office/drawing/2010/main" xmlns="" w="9525">
+                <a14:hiddenLine xmlns="" xmlns:a14="http://schemas.microsoft.com/office/drawing/2010/main" w="9525">
                   <a:solidFill>
                     <a:srgbClr val="000000"/>
                   </a:solidFill>
@@ -3271,7 +3276,7 @@
             </a:ln>
             <a:extLst>
               <a:ext uri="{91240B29-F687-4f45-9708-019B960494DF}">
-                <a14:hiddenLine xmlns:a14="http://schemas.microsoft.com/office/drawing/2010/main" xmlns="" w="9525">
+                <a14:hiddenLine xmlns="" xmlns:a14="http://schemas.microsoft.com/office/drawing/2010/main" w="9525">
                   <a:solidFill>
                     <a:srgbClr val="000000"/>
                   </a:solidFill>
@@ -3361,7 +3366,7 @@
             </a:ln>
             <a:extLst>
               <a:ext uri="{91240B29-F687-4f45-9708-019B960494DF}">
-                <a14:hiddenLine xmlns:a14="http://schemas.microsoft.com/office/drawing/2010/main" xmlns="" w="9525">
+                <a14:hiddenLine xmlns="" xmlns:a14="http://schemas.microsoft.com/office/drawing/2010/main" w="9525">
                   <a:solidFill>
                     <a:srgbClr val="000000"/>
                   </a:solidFill>
@@ -3423,7 +3428,7 @@
             </a:ln>
             <a:extLst>
               <a:ext uri="{91240B29-F687-4f45-9708-019B960494DF}">
-                <a14:hiddenLine xmlns:a14="http://schemas.microsoft.com/office/drawing/2010/main" xmlns="" w="9525">
+                <a14:hiddenLine xmlns="" xmlns:a14="http://schemas.microsoft.com/office/drawing/2010/main" w="9525">
                   <a:solidFill>
                     <a:srgbClr val="000000"/>
                   </a:solidFill>
@@ -3513,7 +3518,7 @@
             </a:ln>
             <a:extLst>
               <a:ext uri="{91240B29-F687-4f45-9708-019B960494DF}">
-                <a14:hiddenLine xmlns:a14="http://schemas.microsoft.com/office/drawing/2010/main" xmlns="" w="9525">
+                <a14:hiddenLine xmlns="" xmlns:a14="http://schemas.microsoft.com/office/drawing/2010/main" w="9525">
                   <a:solidFill>
                     <a:srgbClr val="000000"/>
                   </a:solidFill>
@@ -3603,7 +3608,7 @@
             </a:ln>
             <a:extLst>
               <a:ext uri="{91240B29-F687-4f45-9708-019B960494DF}">
-                <a14:hiddenLine xmlns:a14="http://schemas.microsoft.com/office/drawing/2010/main" xmlns="" w="9525">
+                <a14:hiddenLine xmlns="" xmlns:a14="http://schemas.microsoft.com/office/drawing/2010/main" w="9525">
                   <a:solidFill>
                     <a:srgbClr val="000000"/>
                   </a:solidFill>
@@ -3668,7 +3673,7 @@
             </a:ln>
             <a:extLst>
               <a:ext uri="{91240B29-F687-4f45-9708-019B960494DF}">
-                <a14:hiddenLine xmlns:a14="http://schemas.microsoft.com/office/drawing/2010/main" xmlns="" w="9525">
+                <a14:hiddenLine xmlns="" xmlns:a14="http://schemas.microsoft.com/office/drawing/2010/main" w="9525">
                   <a:solidFill>
                     <a:srgbClr val="000000"/>
                   </a:solidFill>
@@ -3730,7 +3735,7 @@
             </a:ln>
             <a:extLst>
               <a:ext uri="{91240B29-F687-4f45-9708-019B960494DF}">
-                <a14:hiddenLine xmlns:a14="http://schemas.microsoft.com/office/drawing/2010/main" xmlns="" w="9525">
+                <a14:hiddenLine xmlns="" xmlns:a14="http://schemas.microsoft.com/office/drawing/2010/main" w="9525">
                   <a:solidFill>
                     <a:srgbClr val="000000"/>
                   </a:solidFill>
@@ -3820,7 +3825,7 @@
             </a:ln>
             <a:extLst>
               <a:ext uri="{91240B29-F687-4f45-9708-019B960494DF}">
-                <a14:hiddenLine xmlns:a14="http://schemas.microsoft.com/office/drawing/2010/main" xmlns="" w="9525">
+                <a14:hiddenLine xmlns="" xmlns:a14="http://schemas.microsoft.com/office/drawing/2010/main" w="9525">
                   <a:solidFill>
                     <a:srgbClr val="000000"/>
                   </a:solidFill>
@@ -3910,7 +3915,7 @@
             </a:ln>
             <a:extLst>
               <a:ext uri="{91240B29-F687-4f45-9708-019B960494DF}">
-                <a14:hiddenLine xmlns:a14="http://schemas.microsoft.com/office/drawing/2010/main" xmlns="" w="9525">
+                <a14:hiddenLine xmlns="" xmlns:a14="http://schemas.microsoft.com/office/drawing/2010/main" w="9525">
                   <a:solidFill>
                     <a:srgbClr val="000000"/>
                   </a:solidFill>
@@ -3972,7 +3977,7 @@
             </a:ln>
             <a:extLst>
               <a:ext uri="{91240B29-F687-4f45-9708-019B960494DF}">
-                <a14:hiddenLine xmlns:a14="http://schemas.microsoft.com/office/drawing/2010/main" xmlns="" w="9525">
+                <a14:hiddenLine xmlns="" xmlns:a14="http://schemas.microsoft.com/office/drawing/2010/main" w="9525">
                   <a:solidFill>
                     <a:srgbClr val="000000"/>
                   </a:solidFill>
@@ -4092,7 +4097,7 @@
             </a:ln>
             <a:extLst>
               <a:ext uri="{91240B29-F687-4f45-9708-019B960494DF}">
-                <a14:hiddenLine xmlns:a14="http://schemas.microsoft.com/office/drawing/2010/main" xmlns="" w="9525">
+                <a14:hiddenLine xmlns="" xmlns:a14="http://schemas.microsoft.com/office/drawing/2010/main" w="9525">
                   <a:solidFill>
                     <a:srgbClr val="000000"/>
                   </a:solidFill>
@@ -4160,7 +4165,7 @@
             </a:ln>
             <a:extLst>
               <a:ext uri="{91240B29-F687-4f45-9708-019B960494DF}">
-                <a14:hiddenLine xmlns:a14="http://schemas.microsoft.com/office/drawing/2010/main" xmlns="" w="9525">
+                <a14:hiddenLine xmlns="" xmlns:a14="http://schemas.microsoft.com/office/drawing/2010/main" w="9525">
                   <a:solidFill>
                     <a:srgbClr val="000000"/>
                   </a:solidFill>
@@ -4250,7 +4255,7 @@
             </a:ln>
             <a:extLst>
               <a:ext uri="{91240B29-F687-4f45-9708-019B960494DF}">
-                <a14:hiddenLine xmlns:a14="http://schemas.microsoft.com/office/drawing/2010/main" xmlns="" w="9525">
+                <a14:hiddenLine xmlns="" xmlns:a14="http://schemas.microsoft.com/office/drawing/2010/main" w="9525">
                   <a:solidFill>
                     <a:srgbClr val="000000"/>
                   </a:solidFill>
@@ -4390,7 +4395,7 @@
           <a:p>
             <a:fld id="{48A87A34-81AB-432B-8DAE-1953F412C126}" type="datetimeFigureOut">
               <a:rPr lang="en-US" dirty="0"/>
-              <a:t>2/15/22</a:t>
+              <a:t>2/16/2022</a:t>
             </a:fld>
             <a:endParaRPr lang="en-US" dirty="0"/>
           </a:p>
@@ -4652,7 +4657,7 @@
           <a:p>
             <a:fld id="{48A87A34-81AB-432B-8DAE-1953F412C126}" type="datetimeFigureOut">
               <a:rPr lang="en-US" dirty="0"/>
-              <a:t>2/15/22</a:t>
+              <a:t>2/16/2022</a:t>
             </a:fld>
             <a:endParaRPr lang="en-US" dirty="0"/>
           </a:p>
@@ -4843,7 +4848,7 @@
           <a:p>
             <a:fld id="{48A87A34-81AB-432B-8DAE-1953F412C126}" type="datetimeFigureOut">
               <a:rPr lang="en-US" dirty="0"/>
-              <a:t>2/15/22</a:t>
+              <a:t>2/16/2022</a:t>
             </a:fld>
             <a:endParaRPr lang="en-US" dirty="0"/>
           </a:p>
@@ -5101,7 +5106,7 @@
           <a:p>
             <a:fld id="{48A87A34-81AB-432B-8DAE-1953F412C126}" type="datetimeFigureOut">
               <a:rPr lang="en-US" dirty="0"/>
-              <a:t>2/15/22</a:t>
+              <a:t>2/16/2022</a:t>
             </a:fld>
             <a:endParaRPr lang="en-US" dirty="0"/>
           </a:p>
@@ -5530,7 +5535,7 @@
           <a:p>
             <a:fld id="{48A87A34-81AB-432B-8DAE-1953F412C126}" type="datetimeFigureOut">
               <a:rPr lang="en-US" dirty="0"/>
-              <a:t>2/15/22</a:t>
+              <a:t>2/16/2022</a:t>
             </a:fld>
             <a:endParaRPr lang="en-US" dirty="0"/>
           </a:p>
@@ -6071,7 +6076,7 @@
           <a:p>
             <a:fld id="{48A87A34-81AB-432B-8DAE-1953F412C126}" type="datetimeFigureOut">
               <a:rPr lang="en-US" dirty="0"/>
-              <a:t>2/15/22</a:t>
+              <a:t>2/16/2022</a:t>
             </a:fld>
             <a:endParaRPr lang="en-US" dirty="0"/>
           </a:p>
@@ -6786,7 +6791,7 @@
           <a:p>
             <a:fld id="{48A87A34-81AB-432B-8DAE-1953F412C126}" type="datetimeFigureOut">
               <a:rPr lang="en-US" dirty="0"/>
-              <a:t>2/15/22</a:t>
+              <a:t>2/16/2022</a:t>
             </a:fld>
             <a:endParaRPr lang="en-US" dirty="0"/>
           </a:p>
@@ -6951,7 +6956,7 @@
           <a:p>
             <a:fld id="{48A87A34-81AB-432B-8DAE-1953F412C126}" type="datetimeFigureOut">
               <a:rPr lang="en-US" dirty="0"/>
-              <a:t>2/15/22</a:t>
+              <a:t>2/16/2022</a:t>
             </a:fld>
             <a:endParaRPr lang="en-US" dirty="0"/>
           </a:p>
@@ -7126,7 +7131,7 @@
           <a:p>
             <a:fld id="{48A87A34-81AB-432B-8DAE-1953F412C126}" type="datetimeFigureOut">
               <a:rPr lang="en-US" dirty="0"/>
-              <a:t>2/15/22</a:t>
+              <a:t>2/16/2022</a:t>
             </a:fld>
             <a:endParaRPr lang="en-US" dirty="0"/>
           </a:p>
@@ -7291,7 +7296,7 @@
           <a:p>
             <a:fld id="{48A87A34-81AB-432B-8DAE-1953F412C126}" type="datetimeFigureOut">
               <a:rPr lang="en-US" dirty="0"/>
-              <a:t>2/15/22</a:t>
+              <a:t>2/16/2022</a:t>
             </a:fld>
             <a:endParaRPr lang="en-US" dirty="0"/>
           </a:p>
@@ -7536,7 +7541,7 @@
           <a:p>
             <a:fld id="{48A87A34-81AB-432B-8DAE-1953F412C126}" type="datetimeFigureOut">
               <a:rPr lang="en-US" dirty="0"/>
-              <a:t>2/15/22</a:t>
+              <a:t>2/16/2022</a:t>
             </a:fld>
             <a:endParaRPr lang="en-US" dirty="0"/>
           </a:p>
@@ -7763,7 +7768,7 @@
           <a:p>
             <a:fld id="{48A87A34-81AB-432B-8DAE-1953F412C126}" type="datetimeFigureOut">
               <a:rPr lang="en-US" dirty="0"/>
-              <a:t>2/15/22</a:t>
+              <a:t>2/16/2022</a:t>
             </a:fld>
             <a:endParaRPr lang="en-US" dirty="0"/>
           </a:p>
@@ -8139,7 +8144,7 @@
           <a:p>
             <a:fld id="{48A87A34-81AB-432B-8DAE-1953F412C126}" type="datetimeFigureOut">
               <a:rPr lang="en-US" dirty="0"/>
-              <a:t>2/15/22</a:t>
+              <a:t>2/16/2022</a:t>
             </a:fld>
             <a:endParaRPr lang="en-US" dirty="0"/>
           </a:p>
@@ -8252,7 +8257,7 @@
           <a:p>
             <a:fld id="{48A87A34-81AB-432B-8DAE-1953F412C126}" type="datetimeFigureOut">
               <a:rPr lang="en-US" dirty="0"/>
-              <a:t>2/15/22</a:t>
+              <a:t>2/16/2022</a:t>
             </a:fld>
             <a:endParaRPr lang="en-US" dirty="0"/>
           </a:p>
@@ -8342,7 +8347,7 @@
           <a:p>
             <a:fld id="{48A87A34-81AB-432B-8DAE-1953F412C126}" type="datetimeFigureOut">
               <a:rPr lang="en-US" dirty="0"/>
-              <a:t>2/15/22</a:t>
+              <a:t>2/16/2022</a:t>
             </a:fld>
             <a:endParaRPr lang="en-US" dirty="0"/>
           </a:p>
@@ -8586,7 +8591,7 @@
           <a:p>
             <a:fld id="{48A87A34-81AB-432B-8DAE-1953F412C126}" type="datetimeFigureOut">
               <a:rPr lang="en-US" dirty="0"/>
-              <a:t>2/15/22</a:t>
+              <a:t>2/16/2022</a:t>
             </a:fld>
             <a:endParaRPr lang="en-US" dirty="0"/>
           </a:p>
@@ -8861,7 +8866,7 @@
           <a:p>
             <a:fld id="{48A87A34-81AB-432B-8DAE-1953F412C126}" type="datetimeFigureOut">
               <a:rPr lang="en-US" dirty="0"/>
-              <a:t>2/15/22</a:t>
+              <a:t>2/16/2022</a:t>
             </a:fld>
             <a:endParaRPr lang="en-US" dirty="0"/>
           </a:p>
@@ -8972,7 +8977,7 @@
           <a:noFill/>
           <a:extLst>
             <a:ext uri="{909E8E84-426E-40dd-AFC4-6F175D3DCCD1}">
-              <a14:hiddenFill xmlns:a14="http://schemas.microsoft.com/office/drawing/2010/main" xmlns="">
+              <a14:hiddenFill xmlns="" xmlns:a14="http://schemas.microsoft.com/office/drawing/2010/main">
                 <a:solidFill>
                   <a:srgbClr val="FFFFFF"/>
                 </a:solidFill>
@@ -9046,7 +9051,7 @@
               </a:ln>
               <a:extLst>
                 <a:ext uri="{91240B29-F687-4f45-9708-019B960494DF}">
-                  <a14:hiddenLine xmlns:a14="http://schemas.microsoft.com/office/drawing/2010/main" xmlns="" w="9525">
+                  <a14:hiddenLine xmlns="" xmlns:a14="http://schemas.microsoft.com/office/drawing/2010/main" w="9525">
                     <a:solidFill>
                       <a:srgbClr val="000000"/>
                     </a:solidFill>
@@ -9136,7 +9141,7 @@
               </a:ln>
               <a:extLst>
                 <a:ext uri="{91240B29-F687-4f45-9708-019B960494DF}">
-                  <a14:hiddenLine xmlns:a14="http://schemas.microsoft.com/office/drawing/2010/main" xmlns="" w="9525">
+                  <a14:hiddenLine xmlns="" xmlns:a14="http://schemas.microsoft.com/office/drawing/2010/main" w="9525">
                     <a:solidFill>
                       <a:srgbClr val="000000"/>
                     </a:solidFill>
@@ -9226,7 +9231,7 @@
               </a:ln>
               <a:extLst>
                 <a:ext uri="{91240B29-F687-4f45-9708-019B960494DF}">
-                  <a14:hiddenLine xmlns:a14="http://schemas.microsoft.com/office/drawing/2010/main" xmlns="" w="9525">
+                  <a14:hiddenLine xmlns="" xmlns:a14="http://schemas.microsoft.com/office/drawing/2010/main" w="9525">
                     <a:solidFill>
                       <a:srgbClr val="000000"/>
                     </a:solidFill>
@@ -9288,7 +9293,7 @@
               </a:ln>
               <a:extLst>
                 <a:ext uri="{91240B29-F687-4f45-9708-019B960494DF}">
-                  <a14:hiddenLine xmlns:a14="http://schemas.microsoft.com/office/drawing/2010/main" xmlns="" w="9525">
+                  <a14:hiddenLine xmlns="" xmlns:a14="http://schemas.microsoft.com/office/drawing/2010/main" w="9525">
                     <a:solidFill>
                       <a:srgbClr val="000000"/>
                     </a:solidFill>
@@ -9378,7 +9383,7 @@
               </a:ln>
               <a:extLst>
                 <a:ext uri="{91240B29-F687-4f45-9708-019B960494DF}">
-                  <a14:hiddenLine xmlns:a14="http://schemas.microsoft.com/office/drawing/2010/main" xmlns="" w="9525">
+                  <a14:hiddenLine xmlns="" xmlns:a14="http://schemas.microsoft.com/office/drawing/2010/main" w="9525">
                     <a:solidFill>
                       <a:srgbClr val="000000"/>
                     </a:solidFill>
@@ -9440,7 +9445,7 @@
               </a:ln>
               <a:extLst>
                 <a:ext uri="{91240B29-F687-4f45-9708-019B960494DF}">
-                  <a14:hiddenLine xmlns:a14="http://schemas.microsoft.com/office/drawing/2010/main" xmlns="" w="9525">
+                  <a14:hiddenLine xmlns="" xmlns:a14="http://schemas.microsoft.com/office/drawing/2010/main" w="9525">
                     <a:solidFill>
                       <a:srgbClr val="000000"/>
                     </a:solidFill>
@@ -9502,7 +9507,7 @@
               </a:ln>
               <a:extLst>
                 <a:ext uri="{91240B29-F687-4f45-9708-019B960494DF}">
-                  <a14:hiddenLine xmlns:a14="http://schemas.microsoft.com/office/drawing/2010/main" xmlns="" w="9525">
+                  <a14:hiddenLine xmlns="" xmlns:a14="http://schemas.microsoft.com/office/drawing/2010/main" w="9525">
                     <a:solidFill>
                       <a:srgbClr val="000000"/>
                     </a:solidFill>
@@ -9592,7 +9597,7 @@
               </a:ln>
               <a:extLst>
                 <a:ext uri="{91240B29-F687-4f45-9708-019B960494DF}">
-                  <a14:hiddenLine xmlns:a14="http://schemas.microsoft.com/office/drawing/2010/main" xmlns="" w="9525">
+                  <a14:hiddenLine xmlns="" xmlns:a14="http://schemas.microsoft.com/office/drawing/2010/main" w="9525">
                     <a:solidFill>
                       <a:srgbClr val="000000"/>
                     </a:solidFill>
@@ -9682,7 +9687,7 @@
               </a:ln>
               <a:extLst>
                 <a:ext uri="{91240B29-F687-4f45-9708-019B960494DF}">
-                  <a14:hiddenLine xmlns:a14="http://schemas.microsoft.com/office/drawing/2010/main" xmlns="" w="9525">
+                  <a14:hiddenLine xmlns="" xmlns:a14="http://schemas.microsoft.com/office/drawing/2010/main" w="9525">
                     <a:solidFill>
                       <a:srgbClr val="000000"/>
                     </a:solidFill>
@@ -9744,7 +9749,7 @@
               </a:ln>
               <a:extLst>
                 <a:ext uri="{91240B29-F687-4f45-9708-019B960494DF}">
-                  <a14:hiddenLine xmlns:a14="http://schemas.microsoft.com/office/drawing/2010/main" xmlns="" w="9525">
+                  <a14:hiddenLine xmlns="" xmlns:a14="http://schemas.microsoft.com/office/drawing/2010/main" w="9525">
                     <a:solidFill>
                       <a:srgbClr val="000000"/>
                     </a:solidFill>
@@ -9854,7 +9859,7 @@
               </a:ln>
               <a:extLst>
                 <a:ext uri="{91240B29-F687-4f45-9708-019B960494DF}">
-                  <a14:hiddenLine xmlns:a14="http://schemas.microsoft.com/office/drawing/2010/main" xmlns="" w="9525">
+                  <a14:hiddenLine xmlns="" xmlns:a14="http://schemas.microsoft.com/office/drawing/2010/main" w="9525">
                     <a:solidFill>
                       <a:srgbClr val="000000"/>
                     </a:solidFill>
@@ -9938,7 +9943,7 @@
               </a:ln>
               <a:extLst>
                 <a:ext uri="{91240B29-F687-4f45-9708-019B960494DF}">
-                  <a14:hiddenLine xmlns:a14="http://schemas.microsoft.com/office/drawing/2010/main" xmlns="" w="9525">
+                  <a14:hiddenLine xmlns="" xmlns:a14="http://schemas.microsoft.com/office/drawing/2010/main" w="9525">
                     <a:solidFill>
                       <a:srgbClr val="000000"/>
                     </a:solidFill>
@@ -10000,7 +10005,7 @@
               </a:ln>
               <a:extLst>
                 <a:ext uri="{91240B29-F687-4f45-9708-019B960494DF}">
-                  <a14:hiddenLine xmlns:a14="http://schemas.microsoft.com/office/drawing/2010/main" xmlns="" w="9525">
+                  <a14:hiddenLine xmlns="" xmlns:a14="http://schemas.microsoft.com/office/drawing/2010/main" w="9525">
                     <a:solidFill>
                       <a:srgbClr val="000000"/>
                     </a:solidFill>
@@ -10062,7 +10067,7 @@
               </a:ln>
               <a:extLst>
                 <a:ext uri="{91240B29-F687-4f45-9708-019B960494DF}">
-                  <a14:hiddenLine xmlns:a14="http://schemas.microsoft.com/office/drawing/2010/main" xmlns="" w="9525">
+                  <a14:hiddenLine xmlns="" xmlns:a14="http://schemas.microsoft.com/office/drawing/2010/main" w="9525">
                     <a:solidFill>
                       <a:srgbClr val="000000"/>
                     </a:solidFill>
@@ -10152,7 +10157,7 @@
               </a:ln>
               <a:extLst>
                 <a:ext uri="{91240B29-F687-4f45-9708-019B960494DF}">
-                  <a14:hiddenLine xmlns:a14="http://schemas.microsoft.com/office/drawing/2010/main" xmlns="" w="9525">
+                  <a14:hiddenLine xmlns="" xmlns:a14="http://schemas.microsoft.com/office/drawing/2010/main" w="9525">
                     <a:solidFill>
                       <a:srgbClr val="000000"/>
                     </a:solidFill>
@@ -10186,7 +10191,7 @@
               </a:ln>
               <a:extLst>
                 <a:ext uri="{91240B29-F687-4f45-9708-019B960494DF}">
-                  <a14:hiddenLine xmlns:a14="http://schemas.microsoft.com/office/drawing/2010/main" xmlns="" w="9525">
+                  <a14:hiddenLine xmlns="" xmlns:a14="http://schemas.microsoft.com/office/drawing/2010/main" w="9525">
                     <a:solidFill>
                       <a:srgbClr val="000000"/>
                     </a:solidFill>
@@ -10251,7 +10256,7 @@
               </a:ln>
               <a:extLst>
                 <a:ext uri="{91240B29-F687-4f45-9708-019B960494DF}">
-                  <a14:hiddenLine xmlns:a14="http://schemas.microsoft.com/office/drawing/2010/main" xmlns="" w="9525">
+                  <a14:hiddenLine xmlns="" xmlns:a14="http://schemas.microsoft.com/office/drawing/2010/main" w="9525">
                     <a:solidFill>
                       <a:srgbClr val="000000"/>
                     </a:solidFill>
@@ -10341,7 +10346,7 @@
               </a:ln>
               <a:extLst>
                 <a:ext uri="{91240B29-F687-4f45-9708-019B960494DF}">
-                  <a14:hiddenLine xmlns:a14="http://schemas.microsoft.com/office/drawing/2010/main" xmlns="" w="9525">
+                  <a14:hiddenLine xmlns="" xmlns:a14="http://schemas.microsoft.com/office/drawing/2010/main" w="9525">
                     <a:solidFill>
                       <a:srgbClr val="000000"/>
                     </a:solidFill>
@@ -10403,7 +10408,7 @@
               </a:ln>
               <a:extLst>
                 <a:ext uri="{91240B29-F687-4f45-9708-019B960494DF}">
-                  <a14:hiddenLine xmlns:a14="http://schemas.microsoft.com/office/drawing/2010/main" xmlns="" w="9525">
+                  <a14:hiddenLine xmlns="" xmlns:a14="http://schemas.microsoft.com/office/drawing/2010/main" w="9525">
                     <a:solidFill>
                       <a:srgbClr val="000000"/>
                     </a:solidFill>
@@ -10493,7 +10498,7 @@
               </a:ln>
               <a:extLst>
                 <a:ext uri="{91240B29-F687-4f45-9708-019B960494DF}">
-                  <a14:hiddenLine xmlns:a14="http://schemas.microsoft.com/office/drawing/2010/main" xmlns="" w="9525">
+                  <a14:hiddenLine xmlns="" xmlns:a14="http://schemas.microsoft.com/office/drawing/2010/main" w="9525">
                     <a:solidFill>
                       <a:srgbClr val="000000"/>
                     </a:solidFill>
@@ -10558,7 +10563,7 @@
               </a:ln>
               <a:extLst>
                 <a:ext uri="{91240B29-F687-4f45-9708-019B960494DF}">
-                  <a14:hiddenLine xmlns:a14="http://schemas.microsoft.com/office/drawing/2010/main" xmlns="" w="9525">
+                  <a14:hiddenLine xmlns="" xmlns:a14="http://schemas.microsoft.com/office/drawing/2010/main" w="9525">
                     <a:solidFill>
                       <a:srgbClr val="000000"/>
                     </a:solidFill>
@@ -10620,7 +10625,7 @@
               </a:ln>
               <a:extLst>
                 <a:ext uri="{91240B29-F687-4f45-9708-019B960494DF}">
-                  <a14:hiddenLine xmlns:a14="http://schemas.microsoft.com/office/drawing/2010/main" xmlns="" w="9525">
+                  <a14:hiddenLine xmlns="" xmlns:a14="http://schemas.microsoft.com/office/drawing/2010/main" w="9525">
                     <a:solidFill>
                       <a:srgbClr val="000000"/>
                     </a:solidFill>
@@ -10710,7 +10715,7 @@
               </a:ln>
               <a:extLst>
                 <a:ext uri="{91240B29-F687-4f45-9708-019B960494DF}">
-                  <a14:hiddenLine xmlns:a14="http://schemas.microsoft.com/office/drawing/2010/main" xmlns="" w="9525">
+                  <a14:hiddenLine xmlns="" xmlns:a14="http://schemas.microsoft.com/office/drawing/2010/main" w="9525">
                     <a:solidFill>
                       <a:srgbClr val="000000"/>
                     </a:solidFill>
@@ -10800,7 +10805,7 @@
               </a:ln>
               <a:extLst>
                 <a:ext uri="{91240B29-F687-4f45-9708-019B960494DF}">
-                  <a14:hiddenLine xmlns:a14="http://schemas.microsoft.com/office/drawing/2010/main" xmlns="" w="9525">
+                  <a14:hiddenLine xmlns="" xmlns:a14="http://schemas.microsoft.com/office/drawing/2010/main" w="9525">
                     <a:solidFill>
                       <a:srgbClr val="000000"/>
                     </a:solidFill>
@@ -10865,7 +10870,7 @@
               </a:ln>
               <a:extLst>
                 <a:ext uri="{91240B29-F687-4f45-9708-019B960494DF}">
-                  <a14:hiddenLine xmlns:a14="http://schemas.microsoft.com/office/drawing/2010/main" xmlns="" w="9525">
+                  <a14:hiddenLine xmlns="" xmlns:a14="http://schemas.microsoft.com/office/drawing/2010/main" w="9525">
                     <a:solidFill>
                       <a:srgbClr val="000000"/>
                     </a:solidFill>
@@ -10985,7 +10990,7 @@
               </a:ln>
               <a:extLst>
                 <a:ext uri="{91240B29-F687-4f45-9708-019B960494DF}">
-                  <a14:hiddenLine xmlns:a14="http://schemas.microsoft.com/office/drawing/2010/main" xmlns="" w="9525">
+                  <a14:hiddenLine xmlns="" xmlns:a14="http://schemas.microsoft.com/office/drawing/2010/main" w="9525">
                     <a:solidFill>
                       <a:srgbClr val="000000"/>
                     </a:solidFill>
@@ -11083,7 +11088,7 @@
               </a:ln>
               <a:extLst>
                 <a:ext uri="{91240B29-F687-4f45-9708-019B960494DF}">
-                  <a14:hiddenLine xmlns:a14="http://schemas.microsoft.com/office/drawing/2010/main" xmlns="" w="9525">
+                  <a14:hiddenLine xmlns="" xmlns:a14="http://schemas.microsoft.com/office/drawing/2010/main" w="9525">
                     <a:solidFill>
                       <a:srgbClr val="000000"/>
                     </a:solidFill>
@@ -11198,7 +11203,7 @@
               </a:ln>
               <a:extLst>
                 <a:ext uri="{91240B29-F687-4f45-9708-019B960494DF}">
-                  <a14:hiddenLine xmlns:a14="http://schemas.microsoft.com/office/drawing/2010/main" xmlns="" w="9525">
+                  <a14:hiddenLine xmlns="" xmlns:a14="http://schemas.microsoft.com/office/drawing/2010/main" w="9525">
                     <a:solidFill>
                       <a:srgbClr val="000000"/>
                     </a:solidFill>
@@ -11288,7 +11293,7 @@
               </a:ln>
               <a:extLst>
                 <a:ext uri="{91240B29-F687-4f45-9708-019B960494DF}">
-                  <a14:hiddenLine xmlns:a14="http://schemas.microsoft.com/office/drawing/2010/main" xmlns="" w="9525">
+                  <a14:hiddenLine xmlns="" xmlns:a14="http://schemas.microsoft.com/office/drawing/2010/main" w="9525">
                     <a:solidFill>
                       <a:srgbClr val="000000"/>
                     </a:solidFill>
@@ -11353,7 +11358,7 @@
               </a:ln>
               <a:extLst>
                 <a:ext uri="{91240B29-F687-4f45-9708-019B960494DF}">
-                  <a14:hiddenLine xmlns:a14="http://schemas.microsoft.com/office/drawing/2010/main" xmlns="" w="9525">
+                  <a14:hiddenLine xmlns="" xmlns:a14="http://schemas.microsoft.com/office/drawing/2010/main" w="9525">
                     <a:solidFill>
                       <a:srgbClr val="000000"/>
                     </a:solidFill>
@@ -11443,7 +11448,7 @@
               </a:ln>
               <a:extLst>
                 <a:ext uri="{91240B29-F687-4f45-9708-019B960494DF}">
-                  <a14:hiddenLine xmlns:a14="http://schemas.microsoft.com/office/drawing/2010/main" xmlns="" w="9525">
+                  <a14:hiddenLine xmlns="" xmlns:a14="http://schemas.microsoft.com/office/drawing/2010/main" w="9525">
                     <a:solidFill>
                       <a:srgbClr val="000000"/>
                     </a:solidFill>
@@ -11511,7 +11516,7 @@
               </a:ln>
               <a:extLst>
                 <a:ext uri="{91240B29-F687-4f45-9708-019B960494DF}">
-                  <a14:hiddenLine xmlns:a14="http://schemas.microsoft.com/office/drawing/2010/main" xmlns="" w="9525">
+                  <a14:hiddenLine xmlns="" xmlns:a14="http://schemas.microsoft.com/office/drawing/2010/main" w="9525">
                     <a:solidFill>
                       <a:srgbClr val="000000"/>
                     </a:solidFill>
@@ -11601,7 +11606,7 @@
               </a:ln>
               <a:extLst>
                 <a:ext uri="{91240B29-F687-4f45-9708-019B960494DF}">
-                  <a14:hiddenLine xmlns:a14="http://schemas.microsoft.com/office/drawing/2010/main" xmlns="" w="9525">
+                  <a14:hiddenLine xmlns="" xmlns:a14="http://schemas.microsoft.com/office/drawing/2010/main" w="9525">
                     <a:solidFill>
                       <a:srgbClr val="000000"/>
                     </a:solidFill>
@@ -11669,7 +11674,7 @@
               </a:ln>
               <a:extLst>
                 <a:ext uri="{91240B29-F687-4f45-9708-019B960494DF}">
-                  <a14:hiddenLine xmlns:a14="http://schemas.microsoft.com/office/drawing/2010/main" xmlns="" w="9525">
+                  <a14:hiddenLine xmlns="" xmlns:a14="http://schemas.microsoft.com/office/drawing/2010/main" w="9525">
                     <a:solidFill>
                       <a:srgbClr val="000000"/>
                     </a:solidFill>
@@ -11759,7 +11764,7 @@
               </a:ln>
               <a:extLst>
                 <a:ext uri="{91240B29-F687-4f45-9708-019B960494DF}">
-                  <a14:hiddenLine xmlns:a14="http://schemas.microsoft.com/office/drawing/2010/main" xmlns="" w="9525">
+                  <a14:hiddenLine xmlns="" xmlns:a14="http://schemas.microsoft.com/office/drawing/2010/main" w="9525">
                     <a:solidFill>
                       <a:srgbClr val="000000"/>
                     </a:solidFill>
@@ -11793,7 +11798,7 @@
               </a:ln>
               <a:extLst>
                 <a:ext uri="{91240B29-F687-4f45-9708-019B960494DF}">
-                  <a14:hiddenLine xmlns:a14="http://schemas.microsoft.com/office/drawing/2010/main" xmlns="" w="9525">
+                  <a14:hiddenLine xmlns="" xmlns:a14="http://schemas.microsoft.com/office/drawing/2010/main" w="9525">
                     <a:solidFill>
                       <a:srgbClr val="000000"/>
                     </a:solidFill>
@@ -11934,7 +11939,7 @@
             <a:fld id="{48A87A34-81AB-432B-8DAE-1953F412C126}" type="datetimeFigureOut">
               <a:rPr lang="en-US" dirty="0"/>
               <a:pPr/>
-              <a:t>2/15/22</a:t>
+              <a:t>2/16/2022</a:t>
             </a:fld>
             <a:endParaRPr lang="en-US" dirty="0"/>
           </a:p>
@@ -12909,6 +12914,875 @@
 </p:sld>
 </file>
 
+<file path=ppt/slides/slide4.xml><?xml version="1.0" encoding="utf-8"?>
+<p:sld xmlns:a="http://schemas.openxmlformats.org/drawingml/2006/main" xmlns:r="http://schemas.openxmlformats.org/officeDocument/2006/relationships" xmlns:p="http://schemas.openxmlformats.org/presentationml/2006/main">
+  <p:cSld>
+    <p:spTree>
+      <p:nvGrpSpPr>
+        <p:cNvPr id="1" name=""/>
+        <p:cNvGrpSpPr/>
+        <p:nvPr/>
+      </p:nvGrpSpPr>
+      <p:grpSpPr>
+        <a:xfrm>
+          <a:off x="0" y="0"/>
+          <a:ext cx="0" cy="0"/>
+          <a:chOff x="0" y="0"/>
+          <a:chExt cx="0" cy="0"/>
+        </a:xfrm>
+      </p:grpSpPr>
+      <p:sp>
+        <p:nvSpPr>
+          <p:cNvPr id="2" name="Title 1">
+            <a:extLst>
+              <a:ext uri="{FF2B5EF4-FFF2-40B4-BE49-F238E27FC236}">
+                <a16:creationId xmlns:a16="http://schemas.microsoft.com/office/drawing/2014/main" id="{A82E4A4C-ECD7-AB40-83AE-F745269DF177}"/>
+              </a:ext>
+            </a:extLst>
+          </p:cNvPr>
+          <p:cNvSpPr>
+            <a:spLocks noGrp="1"/>
+          </p:cNvSpPr>
+          <p:nvPr>
+            <p:ph type="title"/>
+          </p:nvPr>
+        </p:nvSpPr>
+        <p:spPr/>
+        <p:txBody>
+          <a:bodyPr/>
+          <a:lstStyle/>
+          <a:p>
+            <a:r>
+              <a:rPr lang="en-US" dirty="0" err="1"/>
+              <a:t>Stableswap</a:t>
+            </a:r>
+            <a:endParaRPr lang="en-US" dirty="0"/>
+          </a:p>
+        </p:txBody>
+      </p:sp>
+      <p:sp>
+        <p:nvSpPr>
+          <p:cNvPr id="6" name="Content Placeholder 5">
+            <a:extLst>
+              <a:ext uri="{FF2B5EF4-FFF2-40B4-BE49-F238E27FC236}">
+                <a16:creationId xmlns:a16="http://schemas.microsoft.com/office/drawing/2014/main" id="{8DCA92DC-E4D0-434B-B0DE-C81C1BA868B6}"/>
+              </a:ext>
+            </a:extLst>
+          </p:cNvPr>
+          <p:cNvSpPr>
+            <a:spLocks noGrp="1"/>
+          </p:cNvSpPr>
+          <p:nvPr>
+            <p:ph idx="1"/>
+          </p:nvPr>
+        </p:nvSpPr>
+        <p:spPr/>
+        <p:txBody>
+          <a:bodyPr>
+            <a:normAutofit lnSpcReduction="10000"/>
+          </a:bodyPr>
+          <a:lstStyle/>
+          <a:p>
+            <a:r>
+              <a:rPr lang="en-AU" dirty="0"/>
+              <a:t>Multi Asset Liquidity Pool (MALP)</a:t>
+            </a:r>
+          </a:p>
+          <a:p>
+            <a:pPr lvl="1"/>
+            <a:r>
+              <a:rPr lang="en-AU" dirty="0"/>
+              <a:t>BUSD, USDT and USDC for prototype</a:t>
+            </a:r>
+          </a:p>
+          <a:p>
+            <a:r>
+              <a:rPr lang="en-AU" dirty="0"/>
+              <a:t>Infinitely scalable pools</a:t>
+            </a:r>
+          </a:p>
+          <a:p>
+            <a:r>
+              <a:rPr lang="en-AU" dirty="0"/>
+              <a:t>Reduce swap fees</a:t>
+            </a:r>
+          </a:p>
+          <a:p>
+            <a:r>
+              <a:rPr lang="en-AU" dirty="0"/>
+              <a:t>Create interest for depositors</a:t>
+            </a:r>
+          </a:p>
+          <a:p>
+            <a:r>
+              <a:rPr lang="en-AU" dirty="0"/>
+              <a:t>Give over-collateralized loans</a:t>
+            </a:r>
+          </a:p>
+          <a:p>
+            <a:r>
+              <a:rPr lang="en-AU" dirty="0"/>
+              <a:t>Platform collects 10% of all fees</a:t>
+            </a:r>
+          </a:p>
+        </p:txBody>
+      </p:sp>
+      <p:pic>
+        <p:nvPicPr>
+          <p:cNvPr id="9" name="Picture 8">
+            <a:extLst>
+              <a:ext uri="{FF2B5EF4-FFF2-40B4-BE49-F238E27FC236}">
+                <a16:creationId xmlns:a16="http://schemas.microsoft.com/office/drawing/2014/main" id="{FE46EC91-F59D-430E-B25D-8861E1398F5E}"/>
+              </a:ext>
+            </a:extLst>
+          </p:cNvPr>
+          <p:cNvPicPr>
+            <a:picLocks noChangeAspect="1"/>
+          </p:cNvPicPr>
+          <p:nvPr/>
+        </p:nvPicPr>
+        <p:blipFill>
+          <a:blip r:embed="rId2"/>
+          <a:stretch>
+            <a:fillRect/>
+          </a:stretch>
+        </p:blipFill>
+        <p:spPr>
+          <a:xfrm>
+            <a:off x="5781674" y="995854"/>
+            <a:ext cx="6410325" cy="4441086"/>
+          </a:xfrm>
+          <a:prstGeom prst="rect">
+            <a:avLst/>
+          </a:prstGeom>
+        </p:spPr>
+      </p:pic>
+      <p:sp>
+        <p:nvSpPr>
+          <p:cNvPr id="10" name="TextBox 9">
+            <a:extLst>
+              <a:ext uri="{FF2B5EF4-FFF2-40B4-BE49-F238E27FC236}">
+                <a16:creationId xmlns:a16="http://schemas.microsoft.com/office/drawing/2014/main" id="{2A7F0E99-C450-4EF5-B28E-4D7D8A58C511}"/>
+              </a:ext>
+            </a:extLst>
+          </p:cNvPr>
+          <p:cNvSpPr txBox="1"/>
+          <p:nvPr/>
+        </p:nvSpPr>
+        <p:spPr>
+          <a:xfrm>
+            <a:off x="5334000" y="5626162"/>
+            <a:ext cx="6878999" cy="646331"/>
+          </a:xfrm>
+          <a:prstGeom prst="rect">
+            <a:avLst/>
+          </a:prstGeom>
+          <a:noFill/>
+        </p:spPr>
+        <p:txBody>
+          <a:bodyPr wrap="none" rtlCol="0">
+            <a:spAutoFit/>
+          </a:bodyPr>
+          <a:lstStyle/>
+          <a:p>
+            <a:r>
+              <a:rPr lang="en-AU" b="1" dirty="0"/>
+              <a:t>Stable Coin: cryptocurrency designed to be pegged to a specific value,</a:t>
+            </a:r>
+            <a:br>
+              <a:rPr lang="en-AU" b="1" dirty="0"/>
+            </a:br>
+            <a:r>
+              <a:rPr lang="en-AU" b="1" dirty="0"/>
+              <a:t>in this case, 1 USD. </a:t>
+            </a:r>
+          </a:p>
+        </p:txBody>
+      </p:sp>
+    </p:spTree>
+    <p:extLst>
+      <p:ext uri="{BB962C8B-B14F-4D97-AF65-F5344CB8AC3E}">
+        <p14:creationId xmlns:p14="http://schemas.microsoft.com/office/powerpoint/2010/main" val="1691732691"/>
+      </p:ext>
+    </p:extLst>
+  </p:cSld>
+  <p:clrMapOvr>
+    <a:masterClrMapping/>
+  </p:clrMapOvr>
+</p:sld>
+</file>
+
+<file path=ppt/slides/slide5.xml><?xml version="1.0" encoding="utf-8"?>
+<p:sld xmlns:a="http://schemas.openxmlformats.org/drawingml/2006/main" xmlns:r="http://schemas.openxmlformats.org/officeDocument/2006/relationships" xmlns:p="http://schemas.openxmlformats.org/presentationml/2006/main">
+  <p:cSld>
+    <p:spTree>
+      <p:nvGrpSpPr>
+        <p:cNvPr id="1" name=""/>
+        <p:cNvGrpSpPr/>
+        <p:nvPr/>
+      </p:nvGrpSpPr>
+      <p:grpSpPr>
+        <a:xfrm>
+          <a:off x="0" y="0"/>
+          <a:ext cx="0" cy="0"/>
+          <a:chOff x="0" y="0"/>
+          <a:chExt cx="0" cy="0"/>
+        </a:xfrm>
+      </p:grpSpPr>
+      <p:sp>
+        <p:nvSpPr>
+          <p:cNvPr id="2" name="Title 1">
+            <a:extLst>
+              <a:ext uri="{FF2B5EF4-FFF2-40B4-BE49-F238E27FC236}">
+                <a16:creationId xmlns:a16="http://schemas.microsoft.com/office/drawing/2014/main" id="{4801FAAF-86F9-4BDC-82C8-276E66021062}"/>
+              </a:ext>
+            </a:extLst>
+          </p:cNvPr>
+          <p:cNvSpPr>
+            <a:spLocks noGrp="1"/>
+          </p:cNvSpPr>
+          <p:nvPr>
+            <p:ph type="title"/>
+          </p:nvPr>
+        </p:nvSpPr>
+        <p:spPr/>
+        <p:txBody>
+          <a:bodyPr/>
+          <a:lstStyle/>
+          <a:p>
+            <a:r>
+              <a:rPr lang="en-AU" dirty="0"/>
+              <a:t>No more price impact fees</a:t>
+            </a:r>
+          </a:p>
+        </p:txBody>
+      </p:sp>
+      <p:sp>
+        <p:nvSpPr>
+          <p:cNvPr id="3" name="Content Placeholder 2">
+            <a:extLst>
+              <a:ext uri="{FF2B5EF4-FFF2-40B4-BE49-F238E27FC236}">
+                <a16:creationId xmlns:a16="http://schemas.microsoft.com/office/drawing/2014/main" id="{C9D3B307-04D0-434D-ADAD-2F3F8A5E8D88}"/>
+              </a:ext>
+            </a:extLst>
+          </p:cNvPr>
+          <p:cNvSpPr>
+            <a:spLocks noGrp="1"/>
+          </p:cNvSpPr>
+          <p:nvPr>
+            <p:ph idx="1"/>
+          </p:nvPr>
+        </p:nvSpPr>
+        <p:spPr/>
+        <p:txBody>
+          <a:bodyPr/>
+          <a:lstStyle/>
+          <a:p>
+            <a:r>
+              <a:rPr lang="en-AU" dirty="0"/>
+              <a:t>Stable coins are stable – price impact innately makes no sense</a:t>
+            </a:r>
+          </a:p>
+          <a:p>
+            <a:r>
+              <a:rPr lang="en-AU" dirty="0"/>
+              <a:t>Creates loss for traders and investors </a:t>
+            </a:r>
+          </a:p>
+          <a:p>
+            <a:pPr lvl="1"/>
+            <a:r>
+              <a:rPr lang="en-AU" dirty="0"/>
+              <a:t>Income for arbitrage bots exploiting this inefficiency</a:t>
+            </a:r>
+          </a:p>
+          <a:p>
+            <a:r>
+              <a:rPr lang="en-AU" dirty="0"/>
+              <a:t>Solution:</a:t>
+            </a:r>
+          </a:p>
+          <a:p>
+            <a:pPr lvl="1"/>
+            <a:r>
+              <a:rPr lang="en-AU" dirty="0"/>
+              <a:t>Scaling variable rate fee </a:t>
+            </a:r>
+            <a:r>
+              <a:rPr lang="en-AU" dirty="0">
+                <a:sym typeface="Wingdings" panose="05000000000000000000" pitchFamily="2" charset="2"/>
+              </a:rPr>
+              <a:t> upper bound for price impact</a:t>
+            </a:r>
+          </a:p>
+          <a:p>
+            <a:pPr lvl="1"/>
+            <a:r>
+              <a:rPr lang="en-AU" dirty="0">
+                <a:sym typeface="Wingdings" panose="05000000000000000000" pitchFamily="2" charset="2"/>
+              </a:rPr>
+              <a:t>Will scale between near 0% to a maximum of 0.1%</a:t>
+            </a:r>
+          </a:p>
+          <a:p>
+            <a:pPr lvl="1"/>
+            <a:endParaRPr lang="en-AU" dirty="0"/>
+          </a:p>
+        </p:txBody>
+      </p:sp>
+      <p:pic>
+        <p:nvPicPr>
+          <p:cNvPr id="5" name="Picture 4">
+            <a:extLst>
+              <a:ext uri="{FF2B5EF4-FFF2-40B4-BE49-F238E27FC236}">
+                <a16:creationId xmlns:a16="http://schemas.microsoft.com/office/drawing/2014/main" id="{B2400544-D073-40F0-A219-91B96A643484}"/>
+              </a:ext>
+            </a:extLst>
+          </p:cNvPr>
+          <p:cNvPicPr>
+            <a:picLocks noChangeAspect="1"/>
+          </p:cNvPicPr>
+          <p:nvPr/>
+        </p:nvPicPr>
+        <p:blipFill>
+          <a:blip r:embed="rId2"/>
+          <a:stretch>
+            <a:fillRect/>
+          </a:stretch>
+        </p:blipFill>
+        <p:spPr>
+          <a:xfrm>
+            <a:off x="9091016" y="-2335"/>
+            <a:ext cx="3153884" cy="4763248"/>
+          </a:xfrm>
+          <a:prstGeom prst="rect">
+            <a:avLst/>
+          </a:prstGeom>
+        </p:spPr>
+      </p:pic>
+      <p:sp>
+        <p:nvSpPr>
+          <p:cNvPr id="6" name="TextBox 5">
+            <a:extLst>
+              <a:ext uri="{FF2B5EF4-FFF2-40B4-BE49-F238E27FC236}">
+                <a16:creationId xmlns:a16="http://schemas.microsoft.com/office/drawing/2014/main" id="{19B6A50B-95E5-4143-B539-7C442D4847F1}"/>
+              </a:ext>
+            </a:extLst>
+          </p:cNvPr>
+          <p:cNvSpPr txBox="1"/>
+          <p:nvPr/>
+        </p:nvSpPr>
+        <p:spPr>
+          <a:xfrm>
+            <a:off x="9091016" y="4913312"/>
+            <a:ext cx="3184077" cy="1754326"/>
+          </a:xfrm>
+          <a:prstGeom prst="rect">
+            <a:avLst/>
+          </a:prstGeom>
+          <a:noFill/>
+        </p:spPr>
+        <p:txBody>
+          <a:bodyPr wrap="none" rtlCol="0">
+            <a:spAutoFit/>
+          </a:bodyPr>
+          <a:lstStyle/>
+          <a:p>
+            <a:r>
+              <a:rPr lang="en-AU" dirty="0"/>
+              <a:t>$214.8 total fee</a:t>
+            </a:r>
+          </a:p>
+          <a:p>
+            <a:r>
+              <a:rPr lang="en-AU" dirty="0"/>
+              <a:t>$125 gone to liquidity providers</a:t>
+            </a:r>
+          </a:p>
+          <a:p>
+            <a:r>
+              <a:rPr lang="en-AU" dirty="0"/>
+              <a:t>$89.8 gone to price impact </a:t>
+            </a:r>
+          </a:p>
+          <a:p>
+            <a:endParaRPr lang="en-AU" dirty="0"/>
+          </a:p>
+          <a:p>
+            <a:r>
+              <a:rPr lang="en-AU" dirty="0"/>
+              <a:t>At </a:t>
+            </a:r>
+            <a:r>
+              <a:rPr lang="en-AU" dirty="0" err="1"/>
+              <a:t>StableSwap</a:t>
+            </a:r>
+            <a:r>
+              <a:rPr lang="en-AU" dirty="0"/>
+              <a:t>, our max fee</a:t>
+            </a:r>
+          </a:p>
+          <a:p>
+            <a:r>
+              <a:rPr lang="en-AU" dirty="0"/>
+              <a:t>for a $50k trade is $50. </a:t>
+            </a:r>
+          </a:p>
+        </p:txBody>
+      </p:sp>
+    </p:spTree>
+    <p:extLst>
+      <p:ext uri="{BB962C8B-B14F-4D97-AF65-F5344CB8AC3E}">
+        <p14:creationId xmlns:p14="http://schemas.microsoft.com/office/powerpoint/2010/main" val="1350963508"/>
+      </p:ext>
+    </p:extLst>
+  </p:cSld>
+  <p:clrMapOvr>
+    <a:masterClrMapping/>
+  </p:clrMapOvr>
+</p:sld>
+</file>
+
+<file path=ppt/slides/slide6.xml><?xml version="1.0" encoding="utf-8"?>
+<p:sld xmlns:a="http://schemas.openxmlformats.org/drawingml/2006/main" xmlns:r="http://schemas.openxmlformats.org/officeDocument/2006/relationships" xmlns:p="http://schemas.openxmlformats.org/presentationml/2006/main">
+  <p:cSld>
+    <p:spTree>
+      <p:nvGrpSpPr>
+        <p:cNvPr id="1" name=""/>
+        <p:cNvGrpSpPr/>
+        <p:nvPr/>
+      </p:nvGrpSpPr>
+      <p:grpSpPr>
+        <a:xfrm>
+          <a:off x="0" y="0"/>
+          <a:ext cx="0" cy="0"/>
+          <a:chOff x="0" y="0"/>
+          <a:chExt cx="0" cy="0"/>
+        </a:xfrm>
+      </p:grpSpPr>
+      <p:sp>
+        <p:nvSpPr>
+          <p:cNvPr id="2" name="Title 1">
+            <a:extLst>
+              <a:ext uri="{FF2B5EF4-FFF2-40B4-BE49-F238E27FC236}">
+                <a16:creationId xmlns:a16="http://schemas.microsoft.com/office/drawing/2014/main" id="{37299D75-3020-4917-B04C-5C28E28DFDA6}"/>
+              </a:ext>
+            </a:extLst>
+          </p:cNvPr>
+          <p:cNvSpPr>
+            <a:spLocks noGrp="1"/>
+          </p:cNvSpPr>
+          <p:nvPr>
+            <p:ph type="title"/>
+          </p:nvPr>
+        </p:nvSpPr>
+        <p:spPr/>
+        <p:txBody>
+          <a:bodyPr/>
+          <a:lstStyle/>
+          <a:p>
+            <a:r>
+              <a:rPr lang="en-AU" dirty="0"/>
+              <a:t>Game Changer for capital efficiency</a:t>
+            </a:r>
+          </a:p>
+        </p:txBody>
+      </p:sp>
+      <p:sp>
+        <p:nvSpPr>
+          <p:cNvPr id="3" name="Content Placeholder 2">
+            <a:extLst>
+              <a:ext uri="{FF2B5EF4-FFF2-40B4-BE49-F238E27FC236}">
+                <a16:creationId xmlns:a16="http://schemas.microsoft.com/office/drawing/2014/main" id="{D1E3C54C-6191-4B38-BE08-D68D37815E69}"/>
+              </a:ext>
+            </a:extLst>
+          </p:cNvPr>
+          <p:cNvSpPr>
+            <a:spLocks noGrp="1"/>
+          </p:cNvSpPr>
+          <p:nvPr>
+            <p:ph idx="1"/>
+          </p:nvPr>
+        </p:nvSpPr>
+        <p:spPr/>
+        <p:txBody>
+          <a:bodyPr>
+            <a:normAutofit lnSpcReduction="10000"/>
+          </a:bodyPr>
+          <a:lstStyle/>
+          <a:p>
+            <a:r>
+              <a:rPr lang="en-AU" dirty="0"/>
+              <a:t>Double utilisation of funds </a:t>
+            </a:r>
+          </a:p>
+          <a:p>
+            <a:pPr lvl="1"/>
+            <a:r>
+              <a:rPr lang="en-AU" dirty="0"/>
+              <a:t>Additional income source for depositors leading to higher returns</a:t>
+            </a:r>
+          </a:p>
+          <a:p>
+            <a:pPr lvl="1"/>
+            <a:r>
+              <a:rPr lang="en-AU" dirty="0"/>
+              <a:t>Such as allowing other users to take out over-collateralized loans</a:t>
+            </a:r>
+          </a:p>
+          <a:p>
+            <a:r>
+              <a:rPr lang="en-AU" dirty="0"/>
+              <a:t>Currently all done manually</a:t>
+            </a:r>
+          </a:p>
+          <a:p>
+            <a:pPr lvl="1"/>
+            <a:r>
+              <a:rPr lang="en-AU" dirty="0"/>
+              <a:t>Full release will include automated loan approval and liquidations</a:t>
+            </a:r>
+          </a:p>
+          <a:p>
+            <a:r>
+              <a:rPr lang="en-AU" dirty="0"/>
+              <a:t>20% initial interest rate for stable coins</a:t>
+            </a:r>
+          </a:p>
+          <a:p>
+            <a:pPr lvl="1"/>
+            <a:r>
+              <a:rPr lang="en-AU" dirty="0"/>
+              <a:t>For reference, </a:t>
+            </a:r>
+            <a:r>
+              <a:rPr lang="en-AU" dirty="0" err="1"/>
+              <a:t>Binance</a:t>
+            </a:r>
+            <a:r>
+              <a:rPr lang="en-AU" dirty="0"/>
+              <a:t> charges 20.8% interest for margin trading stable coins</a:t>
+            </a:r>
+          </a:p>
+          <a:p>
+            <a:pPr lvl="1"/>
+            <a:r>
+              <a:rPr lang="en-AU" dirty="0"/>
+              <a:t>Anchor Protocol gives approximately 19% APY (daily compound) on Tera USD (UST)</a:t>
+            </a:r>
+          </a:p>
+        </p:txBody>
+      </p:sp>
+    </p:spTree>
+    <p:extLst>
+      <p:ext uri="{BB962C8B-B14F-4D97-AF65-F5344CB8AC3E}">
+        <p14:creationId xmlns:p14="http://schemas.microsoft.com/office/powerpoint/2010/main" val="1283455566"/>
+      </p:ext>
+    </p:extLst>
+  </p:cSld>
+  <p:clrMapOvr>
+    <a:masterClrMapping/>
+  </p:clrMapOvr>
+</p:sld>
+</file>
+
+<file path=ppt/slides/slide7.xml><?xml version="1.0" encoding="utf-8"?>
+<p:sld xmlns:a="http://schemas.openxmlformats.org/drawingml/2006/main" xmlns:r="http://schemas.openxmlformats.org/officeDocument/2006/relationships" xmlns:p="http://schemas.openxmlformats.org/presentationml/2006/main">
+  <p:cSld>
+    <p:spTree>
+      <p:nvGrpSpPr>
+        <p:cNvPr id="1" name=""/>
+        <p:cNvGrpSpPr/>
+        <p:nvPr/>
+      </p:nvGrpSpPr>
+      <p:grpSpPr>
+        <a:xfrm>
+          <a:off x="0" y="0"/>
+          <a:ext cx="0" cy="0"/>
+          <a:chOff x="0" y="0"/>
+          <a:chExt cx="0" cy="0"/>
+        </a:xfrm>
+      </p:grpSpPr>
+      <p:sp>
+        <p:nvSpPr>
+          <p:cNvPr id="2" name="Title 1">
+            <a:extLst>
+              <a:ext uri="{FF2B5EF4-FFF2-40B4-BE49-F238E27FC236}">
+                <a16:creationId xmlns:a16="http://schemas.microsoft.com/office/drawing/2014/main" id="{B12829C8-966D-44B0-86D2-B10D9710D483}"/>
+              </a:ext>
+            </a:extLst>
+          </p:cNvPr>
+          <p:cNvSpPr>
+            <a:spLocks noGrp="1"/>
+          </p:cNvSpPr>
+          <p:nvPr>
+            <p:ph type="title"/>
+          </p:nvPr>
+        </p:nvSpPr>
+        <p:spPr/>
+        <p:txBody>
+          <a:bodyPr/>
+          <a:lstStyle/>
+          <a:p>
+            <a:r>
+              <a:rPr lang="en-AU" dirty="0"/>
+              <a:t>Over-collateralised loans in practice	</a:t>
+            </a:r>
+          </a:p>
+        </p:txBody>
+      </p:sp>
+      <p:sp>
+        <p:nvSpPr>
+          <p:cNvPr id="3" name="Content Placeholder 2">
+            <a:extLst>
+              <a:ext uri="{FF2B5EF4-FFF2-40B4-BE49-F238E27FC236}">
+                <a16:creationId xmlns:a16="http://schemas.microsoft.com/office/drawing/2014/main" id="{D8EE7B05-9A4D-4EA0-ACF0-8F47285A023A}"/>
+              </a:ext>
+            </a:extLst>
+          </p:cNvPr>
+          <p:cNvSpPr>
+            <a:spLocks noGrp="1"/>
+          </p:cNvSpPr>
+          <p:nvPr>
+            <p:ph idx="1"/>
+          </p:nvPr>
+        </p:nvSpPr>
+        <p:spPr/>
+        <p:txBody>
+          <a:bodyPr/>
+          <a:lstStyle/>
+          <a:p>
+            <a:r>
+              <a:rPr lang="en-AU" dirty="0"/>
+              <a:t>Below features are not yet implemented due to time constraints:</a:t>
+            </a:r>
+          </a:p>
+          <a:p>
+            <a:pPr lvl="1"/>
+            <a:r>
+              <a:rPr lang="en-AU" dirty="0"/>
+              <a:t>Auto-approval based on initial LTV ratio</a:t>
+            </a:r>
+          </a:p>
+          <a:p>
+            <a:pPr lvl="1"/>
+            <a:r>
+              <a:rPr lang="en-AU" dirty="0"/>
+              <a:t>Auto-liquidation based on current LTV ratio</a:t>
+            </a:r>
+          </a:p>
+          <a:p>
+            <a:pPr lvl="1"/>
+            <a:r>
+              <a:rPr lang="en-AU" dirty="0"/>
+              <a:t>Maximum loan utilization ratio</a:t>
+            </a:r>
+          </a:p>
+          <a:p>
+            <a:pPr lvl="1"/>
+            <a:r>
+              <a:rPr lang="en-AU" dirty="0"/>
+              <a:t>Variable interest rate depending on loans demand</a:t>
+            </a:r>
+          </a:p>
+        </p:txBody>
+      </p:sp>
+    </p:spTree>
+    <p:extLst>
+      <p:ext uri="{BB962C8B-B14F-4D97-AF65-F5344CB8AC3E}">
+        <p14:creationId xmlns:p14="http://schemas.microsoft.com/office/powerpoint/2010/main" val="4090950523"/>
+      </p:ext>
+    </p:extLst>
+  </p:cSld>
+  <p:clrMapOvr>
+    <a:masterClrMapping/>
+  </p:clrMapOvr>
+</p:sld>
+</file>
+
+<file path=ppt/slides/slide8.xml><?xml version="1.0" encoding="utf-8"?>
+<p:sld xmlns:a="http://schemas.openxmlformats.org/drawingml/2006/main" xmlns:r="http://schemas.openxmlformats.org/officeDocument/2006/relationships" xmlns:p="http://schemas.openxmlformats.org/presentationml/2006/main">
+  <p:cSld>
+    <p:spTree>
+      <p:nvGrpSpPr>
+        <p:cNvPr id="1" name=""/>
+        <p:cNvGrpSpPr/>
+        <p:nvPr/>
+      </p:nvGrpSpPr>
+      <p:grpSpPr>
+        <a:xfrm>
+          <a:off x="0" y="0"/>
+          <a:ext cx="0" cy="0"/>
+          <a:chOff x="0" y="0"/>
+          <a:chExt cx="0" cy="0"/>
+        </a:xfrm>
+      </p:grpSpPr>
+      <p:sp>
+        <p:nvSpPr>
+          <p:cNvPr id="2" name="Title 1">
+            <a:extLst>
+              <a:ext uri="{FF2B5EF4-FFF2-40B4-BE49-F238E27FC236}">
+                <a16:creationId xmlns:a16="http://schemas.microsoft.com/office/drawing/2014/main" id="{82D7CB43-9AF8-4B36-9FB3-7862E1E6148C}"/>
+              </a:ext>
+            </a:extLst>
+          </p:cNvPr>
+          <p:cNvSpPr>
+            <a:spLocks noGrp="1"/>
+          </p:cNvSpPr>
+          <p:nvPr>
+            <p:ph type="title"/>
+          </p:nvPr>
+        </p:nvSpPr>
+        <p:spPr/>
+        <p:txBody>
+          <a:bodyPr/>
+          <a:lstStyle/>
+          <a:p>
+            <a:r>
+              <a:rPr lang="en-AU" dirty="0"/>
+              <a:t>The future of </a:t>
+            </a:r>
+            <a:r>
+              <a:rPr lang="en-AU" dirty="0" err="1"/>
+              <a:t>stableswap</a:t>
+            </a:r>
+            <a:endParaRPr lang="en-AU" dirty="0"/>
+          </a:p>
+        </p:txBody>
+      </p:sp>
+      <p:sp>
+        <p:nvSpPr>
+          <p:cNvPr id="3" name="Content Placeholder 2">
+            <a:extLst>
+              <a:ext uri="{FF2B5EF4-FFF2-40B4-BE49-F238E27FC236}">
+                <a16:creationId xmlns:a16="http://schemas.microsoft.com/office/drawing/2014/main" id="{C253EFEE-43C2-4DAC-BDC5-1A3F83A61DC3}"/>
+              </a:ext>
+            </a:extLst>
+          </p:cNvPr>
+          <p:cNvSpPr>
+            <a:spLocks noGrp="1"/>
+          </p:cNvSpPr>
+          <p:nvPr>
+            <p:ph idx="1"/>
+          </p:nvPr>
+        </p:nvSpPr>
+        <p:spPr>
+          <a:xfrm>
+            <a:off x="600075" y="1982786"/>
+            <a:ext cx="11096625" cy="4408489"/>
+          </a:xfrm>
+        </p:spPr>
+        <p:txBody>
+          <a:bodyPr>
+            <a:normAutofit lnSpcReduction="10000"/>
+          </a:bodyPr>
+          <a:lstStyle/>
+          <a:p>
+            <a:r>
+              <a:rPr lang="en-AU" dirty="0"/>
+              <a:t>Currently in the process of implementing this in a real world setting </a:t>
+            </a:r>
+            <a:r>
+              <a:rPr lang="en-AU" b="1" dirty="0"/>
+              <a:t>under a new name</a:t>
+            </a:r>
+          </a:p>
+          <a:p>
+            <a:r>
+              <a:rPr lang="en-AU" dirty="0"/>
+              <a:t>In our team:</a:t>
+            </a:r>
+          </a:p>
+          <a:p>
+            <a:pPr lvl="1"/>
+            <a:r>
+              <a:rPr lang="en-AU" dirty="0" err="1"/>
+              <a:t>Discidium</a:t>
+            </a:r>
+            <a:r>
+              <a:rPr lang="en-AU" dirty="0"/>
+              <a:t> Pty Ltd as the project management team (co-founder)  </a:t>
+            </a:r>
+          </a:p>
+          <a:p>
+            <a:pPr lvl="1"/>
+            <a:r>
+              <a:rPr lang="en-AU" dirty="0" err="1"/>
+              <a:t>Everlume</a:t>
+            </a:r>
+            <a:r>
+              <a:rPr lang="en-AU" dirty="0"/>
+              <a:t> as the marketing management team (core team)</a:t>
+            </a:r>
+          </a:p>
+          <a:p>
+            <a:pPr lvl="1"/>
+            <a:r>
+              <a:rPr lang="en-AU" dirty="0" err="1"/>
+              <a:t>Viseth</a:t>
+            </a:r>
+            <a:r>
+              <a:rPr lang="en-AU" dirty="0"/>
+              <a:t> (core team/advisor), Toby (core team/advisor) and Simon (founder)</a:t>
+            </a:r>
+          </a:p>
+          <a:p>
+            <a:r>
+              <a:rPr lang="en-AU" dirty="0"/>
+              <a:t>Looking for:</a:t>
+            </a:r>
+          </a:p>
+          <a:p>
+            <a:pPr lvl="1"/>
+            <a:r>
+              <a:rPr lang="en-AU" dirty="0"/>
+              <a:t>Smart contract programmers (funded with initial capital injection)</a:t>
+            </a:r>
+          </a:p>
+          <a:p>
+            <a:pPr lvl="1"/>
+            <a:r>
+              <a:rPr lang="en-AU" dirty="0"/>
+              <a:t>VCs and angel investors (in 4-6 months)</a:t>
+            </a:r>
+          </a:p>
+          <a:p>
+            <a:pPr lvl="1"/>
+            <a:r>
+              <a:rPr lang="en-AU" dirty="0"/>
+              <a:t>Advisors in the field of </a:t>
+            </a:r>
+            <a:r>
+              <a:rPr lang="en-AU" dirty="0" err="1"/>
+              <a:t>DeFi</a:t>
+            </a:r>
+            <a:r>
+              <a:rPr lang="en-AU" dirty="0"/>
+              <a:t>/blockchain and marketing/influencers</a:t>
+            </a:r>
+          </a:p>
+          <a:p>
+            <a:pPr lvl="1"/>
+            <a:r>
+              <a:rPr lang="en-AU" dirty="0"/>
+              <a:t>Any other parties interested in our project!</a:t>
+            </a:r>
+          </a:p>
+        </p:txBody>
+      </p:sp>
+    </p:spTree>
+    <p:extLst>
+      <p:ext uri="{BB962C8B-B14F-4D97-AF65-F5344CB8AC3E}">
+        <p14:creationId xmlns:p14="http://schemas.microsoft.com/office/powerpoint/2010/main" val="889059425"/>
+      </p:ext>
+    </p:extLst>
+  </p:cSld>
+  <p:clrMapOvr>
+    <a:masterClrMapping/>
+  </p:clrMapOvr>
+</p:sld>
+</file>
+
 <file path=ppt/theme/theme1.xml><?xml version="1.0" encoding="utf-8"?>
 <a:theme xmlns:a="http://schemas.openxmlformats.org/drawingml/2006/main" name="Circuit">
   <a:themeElements>

</xml_diff>